<commit_message>
tweaked L4.1,L4.2 in progress
</commit_message>
<xml_diff>
--- a/Slides/Lesson 4.1 The JavaScript Thread Model.pptx
+++ b/Slides/Lesson 4.1 The JavaScript Thread Model.pptx
@@ -15,18 +15,18 @@
     <p:sldId id="349" r:id="rId6"/>
     <p:sldId id="350" r:id="rId7"/>
     <p:sldId id="353" r:id="rId8"/>
-    <p:sldId id="354" r:id="rId9"/>
-    <p:sldId id="355" r:id="rId10"/>
-    <p:sldId id="356" r:id="rId11"/>
-    <p:sldId id="357" r:id="rId12"/>
-    <p:sldId id="361" r:id="rId13"/>
-    <p:sldId id="358" r:id="rId14"/>
-    <p:sldId id="362" r:id="rId15"/>
-    <p:sldId id="359" r:id="rId16"/>
-    <p:sldId id="363" r:id="rId17"/>
-    <p:sldId id="360" r:id="rId18"/>
-    <p:sldId id="364" r:id="rId19"/>
-    <p:sldId id="347" r:id="rId20"/>
+    <p:sldId id="365" r:id="rId9"/>
+    <p:sldId id="354" r:id="rId10"/>
+    <p:sldId id="355" r:id="rId11"/>
+    <p:sldId id="356" r:id="rId12"/>
+    <p:sldId id="357" r:id="rId13"/>
+    <p:sldId id="361" r:id="rId14"/>
+    <p:sldId id="358" r:id="rId15"/>
+    <p:sldId id="362" r:id="rId16"/>
+    <p:sldId id="359" r:id="rId17"/>
+    <p:sldId id="363" r:id="rId18"/>
+    <p:sldId id="360" r:id="rId19"/>
+    <p:sldId id="364" r:id="rId20"/>
     <p:sldId id="303" r:id="rId21"/>
     <p:sldId id="298" r:id="rId22"/>
     <p:sldId id="348" r:id="rId23"/>
@@ -245,7 +245,7 @@
           <a:p>
             <a:fld id="{7C7E5181-6CF5-45F7-A87A-E0E0B1FD7549}" type="datetimeFigureOut">
               <a:rPr lang="en-US" smtClean="0"/>
-              <a:t>2/3/2021</a:t>
+              <a:t>2/5/2021</a:t>
             </a:fld>
             <a:endParaRPr lang="en-US"/>
           </a:p>
@@ -666,7 +666,7 @@
           <a:p>
             <a:fld id="{5D2A64DE-480B-420F-9649-4F8E696E08E0}" type="datetime1">
               <a:rPr lang="en-US" smtClean="0"/>
-              <a:t>2/3/2021</a:t>
+              <a:t>2/5/2021</a:t>
             </a:fld>
             <a:endParaRPr lang="en-US"/>
           </a:p>
@@ -900,7 +900,7 @@
           <a:p>
             <a:fld id="{0D3616D0-8311-4107-9726-6B805E7D05BA}" type="datetime1">
               <a:rPr lang="en-US" smtClean="0"/>
-              <a:t>2/3/2021</a:t>
+              <a:t>2/5/2021</a:t>
             </a:fld>
             <a:endParaRPr lang="en-US"/>
           </a:p>
@@ -1108,7 +1108,7 @@
           <a:p>
             <a:fld id="{3BC2557A-5C88-417A-A763-5AC779462A5F}" type="datetime1">
               <a:rPr lang="en-US" smtClean="0"/>
-              <a:t>2/3/2021</a:t>
+              <a:t>2/5/2021</a:t>
             </a:fld>
             <a:endParaRPr lang="en-US"/>
           </a:p>
@@ -1860,7 +1860,7 @@
           <a:p>
             <a:fld id="{07C7BFD4-467E-4EDE-93EA-052F5B39A4E5}" type="datetime1">
               <a:rPr lang="en-US" smtClean="0"/>
-              <a:t>2/3/2021</a:t>
+              <a:t>2/5/2021</a:t>
             </a:fld>
             <a:endParaRPr lang="en-US"/>
           </a:p>
@@ -2173,7 +2173,7 @@
           <a:p>
             <a:fld id="{A533CBE2-D5BE-47AC-ADC2-9CDFC1D0CF90}" type="datetime1">
               <a:rPr lang="en-US" smtClean="0"/>
-              <a:t>2/3/2021</a:t>
+              <a:t>2/5/2021</a:t>
             </a:fld>
             <a:endParaRPr lang="en-US"/>
           </a:p>
@@ -2474,7 +2474,7 @@
           <a:p>
             <a:fld id="{39B7EDB1-CE74-4951-85A2-0B01C2128E28}" type="datetime1">
               <a:rPr lang="en-US" smtClean="0"/>
-              <a:t>2/3/2021</a:t>
+              <a:t>2/5/2021</a:t>
             </a:fld>
             <a:endParaRPr lang="en-US"/>
           </a:p>
@@ -2922,7 +2922,7 @@
           <a:p>
             <a:fld id="{2BC7EB92-A5C2-4807-A9DC-9EDE6CBFB241}" type="datetime1">
               <a:rPr lang="en-US" smtClean="0"/>
-              <a:t>2/3/2021</a:t>
+              <a:t>2/5/2021</a:t>
             </a:fld>
             <a:endParaRPr lang="en-US"/>
           </a:p>
@@ -3068,7 +3068,7 @@
           <a:p>
             <a:fld id="{109E55A0-C911-4F03-82FC-7E5926047D46}" type="datetime1">
               <a:rPr lang="en-US" smtClean="0"/>
-              <a:t>2/3/2021</a:t>
+              <a:t>2/5/2021</a:t>
             </a:fld>
             <a:endParaRPr lang="en-US"/>
           </a:p>
@@ -3217,7 +3217,7 @@
           <a:p>
             <a:fld id="{2B7B7EE0-7771-4CD5-9B2B-3550753A54A1}" type="datetime1">
               <a:rPr lang="en-US" smtClean="0"/>
-              <a:t>2/3/2021</a:t>
+              <a:t>2/5/2021</a:t>
             </a:fld>
             <a:endParaRPr lang="en-US"/>
           </a:p>
@@ -3528,7 +3528,7 @@
           <a:p>
             <a:fld id="{F8B318B3-0E87-4416-A9B8-D891968C2727}" type="datetime1">
               <a:rPr lang="en-US" smtClean="0"/>
-              <a:t>2/3/2021</a:t>
+              <a:t>2/5/2021</a:t>
             </a:fld>
             <a:endParaRPr lang="en-US"/>
           </a:p>
@@ -3816,7 +3816,7 @@
           <a:p>
             <a:fld id="{EA476A42-A091-4468-A075-64A31BE59948}" type="datetime1">
               <a:rPr lang="en-US" smtClean="0"/>
-              <a:t>2/3/2021</a:t>
+              <a:t>2/5/2021</a:t>
             </a:fld>
             <a:endParaRPr lang="en-US"/>
           </a:p>
@@ -4057,7 +4057,7 @@
           <a:p>
             <a:fld id="{54D997E8-DDEE-43F1-8D9B-F8A1E11DE488}" type="datetime1">
               <a:rPr lang="en-US" smtClean="0"/>
-              <a:t>2/3/2021</a:t>
+              <a:t>2/5/2021</a:t>
             </a:fld>
             <a:endParaRPr lang="en-US"/>
           </a:p>
@@ -4748,6 +4748,662 @@
           <p:cNvPr id="2" name="Title 1">
             <a:extLst>
               <a:ext uri="{FF2B5EF4-FFF2-40B4-BE49-F238E27FC236}">
+                <a16:creationId xmlns:a16="http://schemas.microsoft.com/office/drawing/2014/main" id="{9856CDAB-EDB2-430B-891E-15491BE49E14}"/>
+              </a:ext>
+            </a:extLst>
+          </p:cNvPr>
+          <p:cNvSpPr>
+            <a:spLocks noGrp="1"/>
+          </p:cNvSpPr>
+          <p:nvPr>
+            <p:ph type="title"/>
+          </p:nvPr>
+        </p:nvSpPr>
+        <p:spPr/>
+        <p:txBody>
+          <a:bodyPr/>
+          <a:lstStyle/>
+          <a:p>
+            <a:r>
+              <a:rPr lang="en-US" dirty="0"/>
+              <a:t>Naming the thread you just created</a:t>
+            </a:r>
+          </a:p>
+        </p:txBody>
+      </p:sp>
+      <p:sp>
+        <p:nvSpPr>
+          <p:cNvPr id="3" name="Content Placeholder 2">
+            <a:extLst>
+              <a:ext uri="{FF2B5EF4-FFF2-40B4-BE49-F238E27FC236}">
+                <a16:creationId xmlns:a16="http://schemas.microsoft.com/office/drawing/2014/main" id="{1E1F461F-81C7-4B85-BCFB-650200814A20}"/>
+              </a:ext>
+            </a:extLst>
+          </p:cNvPr>
+          <p:cNvSpPr>
+            <a:spLocks noGrp="1"/>
+          </p:cNvSpPr>
+          <p:nvPr>
+            <p:ph idx="1"/>
+          </p:nvPr>
+        </p:nvSpPr>
+        <p:spPr/>
+        <p:txBody>
+          <a:bodyPr/>
+          <a:lstStyle/>
+          <a:p>
+            <a:r>
+              <a:rPr lang="en-US" dirty="0"/>
+              <a:t>When you create a thread, you can get a handle for it.  This handle is called a </a:t>
+            </a:r>
+            <a:r>
+              <a:rPr lang="en-US" dirty="0">
+                <a:solidFill>
+                  <a:srgbClr val="FF0000"/>
+                </a:solidFill>
+              </a:rPr>
+              <a:t>promise</a:t>
+            </a:r>
+            <a:r>
+              <a:rPr lang="en-US" dirty="0"/>
+              <a:t>.</a:t>
+            </a:r>
+          </a:p>
+        </p:txBody>
+      </p:sp>
+      <p:sp>
+        <p:nvSpPr>
+          <p:cNvPr id="4" name="Slide Number Placeholder 3">
+            <a:extLst>
+              <a:ext uri="{FF2B5EF4-FFF2-40B4-BE49-F238E27FC236}">
+                <a16:creationId xmlns:a16="http://schemas.microsoft.com/office/drawing/2014/main" id="{37201718-DDAB-4795-A020-96ACB86F6648}"/>
+              </a:ext>
+            </a:extLst>
+          </p:cNvPr>
+          <p:cNvSpPr>
+            <a:spLocks noGrp="1"/>
+          </p:cNvSpPr>
+          <p:nvPr>
+            <p:ph type="sldNum" sz="quarter" idx="12"/>
+          </p:nvPr>
+        </p:nvSpPr>
+        <p:spPr/>
+        <p:txBody>
+          <a:bodyPr/>
+          <a:lstStyle/>
+          <a:p>
+            <a:fld id="{20F37917-FD3A-4669-9018-DA04BCDD3D75}" type="slidenum">
+              <a:rPr lang="en-US" smtClean="0"/>
+              <a:t>10</a:t>
+            </a:fld>
+            <a:endParaRPr lang="en-US"/>
+          </a:p>
+        </p:txBody>
+      </p:sp>
+      <p:sp>
+        <p:nvSpPr>
+          <p:cNvPr id="5" name="Rectangle 4">
+            <a:extLst>
+              <a:ext uri="{FF2B5EF4-FFF2-40B4-BE49-F238E27FC236}">
+                <a16:creationId xmlns:a16="http://schemas.microsoft.com/office/drawing/2014/main" id="{CC2BDC1D-7D7A-4BA3-BB02-E2B1E3B9E537}"/>
+              </a:ext>
+            </a:extLst>
+          </p:cNvPr>
+          <p:cNvSpPr/>
+          <p:nvPr/>
+        </p:nvSpPr>
+        <p:spPr>
+          <a:xfrm>
+            <a:off x="1081635" y="2410605"/>
+            <a:ext cx="6096000" cy="3693319"/>
+          </a:xfrm>
+          <a:prstGeom prst="rect">
+            <a:avLst/>
+          </a:prstGeom>
+        </p:spPr>
+        <p:txBody>
+          <a:bodyPr>
+            <a:spAutoFit/>
+          </a:bodyPr>
+          <a:lstStyle/>
+          <a:p>
+            <a:r>
+              <a:rPr lang="en-US" dirty="0">
+                <a:solidFill>
+                  <a:srgbClr val="000000"/>
+                </a:solidFill>
+                <a:latin typeface="Consolas" panose="020B0609020204030204" pitchFamily="49" charset="0"/>
+              </a:rPr>
+              <a:t>console.log(</a:t>
+            </a:r>
+            <a:r>
+              <a:rPr lang="en-US" dirty="0">
+                <a:solidFill>
+                  <a:srgbClr val="A31515"/>
+                </a:solidFill>
+                <a:latin typeface="Consolas" panose="020B0609020204030204" pitchFamily="49" charset="0"/>
+              </a:rPr>
+              <a:t>"main thread running"</a:t>
+            </a:r>
+            <a:r>
+              <a:rPr lang="en-US" dirty="0">
+                <a:solidFill>
+                  <a:srgbClr val="000000"/>
+                </a:solidFill>
+                <a:latin typeface="Consolas" panose="020B0609020204030204" pitchFamily="49" charset="0"/>
+              </a:rPr>
+              <a:t>)</a:t>
+            </a:r>
+          </a:p>
+          <a:p>
+            <a:br>
+              <a:rPr lang="en-US" dirty="0">
+                <a:solidFill>
+                  <a:srgbClr val="000000"/>
+                </a:solidFill>
+                <a:latin typeface="Consolas" panose="020B0609020204030204" pitchFamily="49" charset="0"/>
+              </a:rPr>
+            </a:br>
+            <a:r>
+              <a:rPr lang="en-US" dirty="0">
+                <a:solidFill>
+                  <a:srgbClr val="0000FF"/>
+                </a:solidFill>
+                <a:latin typeface="Consolas" panose="020B0609020204030204" pitchFamily="49" charset="0"/>
+              </a:rPr>
+              <a:t>const</a:t>
+            </a:r>
+            <a:r>
+              <a:rPr lang="en-US" dirty="0">
+                <a:solidFill>
+                  <a:srgbClr val="000000"/>
+                </a:solidFill>
+                <a:latin typeface="Consolas" panose="020B0609020204030204" pitchFamily="49" charset="0"/>
+              </a:rPr>
+              <a:t> p2 = </a:t>
+            </a:r>
+            <a:r>
+              <a:rPr lang="en-US" dirty="0">
+                <a:solidFill>
+                  <a:srgbClr val="0000FF"/>
+                </a:solidFill>
+                <a:latin typeface="Consolas" panose="020B0609020204030204" pitchFamily="49" charset="0"/>
+              </a:rPr>
+              <a:t>new</a:t>
+            </a:r>
+            <a:r>
+              <a:rPr lang="en-US" dirty="0">
+                <a:solidFill>
+                  <a:srgbClr val="000000"/>
+                </a:solidFill>
+                <a:latin typeface="Consolas" panose="020B0609020204030204" pitchFamily="49" charset="0"/>
+              </a:rPr>
+              <a:t> Promise((resolve) </a:t>
+            </a:r>
+            <a:r>
+              <a:rPr lang="en-US" dirty="0">
+                <a:solidFill>
+                  <a:srgbClr val="0000FF"/>
+                </a:solidFill>
+                <a:latin typeface="Consolas" panose="020B0609020204030204" pitchFamily="49" charset="0"/>
+              </a:rPr>
+              <a:t>=&gt;</a:t>
+            </a:r>
+            <a:r>
+              <a:rPr lang="en-US" dirty="0">
+                <a:solidFill>
+                  <a:srgbClr val="000000"/>
+                </a:solidFill>
+                <a:latin typeface="Consolas" panose="020B0609020204030204" pitchFamily="49" charset="0"/>
+              </a:rPr>
+              <a:t> {</a:t>
+            </a:r>
+          </a:p>
+          <a:p>
+            <a:r>
+              <a:rPr lang="en-US" dirty="0">
+                <a:solidFill>
+                  <a:srgbClr val="000000"/>
+                </a:solidFill>
+                <a:latin typeface="Consolas" panose="020B0609020204030204" pitchFamily="49" charset="0"/>
+              </a:rPr>
+              <a:t>    console.log(</a:t>
+            </a:r>
+            <a:r>
+              <a:rPr lang="en-US" dirty="0">
+                <a:solidFill>
+                  <a:srgbClr val="A31515"/>
+                </a:solidFill>
+                <a:latin typeface="Consolas" panose="020B0609020204030204" pitchFamily="49" charset="0"/>
+              </a:rPr>
+              <a:t>"this part is run immediately"</a:t>
+            </a:r>
+            <a:r>
+              <a:rPr lang="en-US" dirty="0">
+                <a:solidFill>
+                  <a:srgbClr val="000000"/>
+                </a:solidFill>
+                <a:latin typeface="Consolas" panose="020B0609020204030204" pitchFamily="49" charset="0"/>
+              </a:rPr>
+              <a:t>)</a:t>
+            </a:r>
+          </a:p>
+          <a:p>
+            <a:r>
+              <a:rPr lang="en-US" dirty="0">
+                <a:solidFill>
+                  <a:srgbClr val="000000"/>
+                </a:solidFill>
+                <a:latin typeface="Consolas" panose="020B0609020204030204" pitchFamily="49" charset="0"/>
+              </a:rPr>
+              <a:t>    console.log(</a:t>
+            </a:r>
+            <a:r>
+              <a:rPr lang="en-US" dirty="0">
+                <a:solidFill>
+                  <a:srgbClr val="A31515"/>
+                </a:solidFill>
+                <a:latin typeface="Consolas" panose="020B0609020204030204" pitchFamily="49" charset="0"/>
+              </a:rPr>
+              <a:t>"creating new thread..."</a:t>
+            </a:r>
+            <a:r>
+              <a:rPr lang="en-US" dirty="0">
+                <a:solidFill>
+                  <a:srgbClr val="000000"/>
+                </a:solidFill>
+                <a:latin typeface="Consolas" panose="020B0609020204030204" pitchFamily="49" charset="0"/>
+              </a:rPr>
+              <a:t>)</a:t>
+            </a:r>
+          </a:p>
+          <a:p>
+            <a:r>
+              <a:rPr lang="en-US" dirty="0">
+                <a:solidFill>
+                  <a:srgbClr val="000000"/>
+                </a:solidFill>
+                <a:latin typeface="Consolas" panose="020B0609020204030204" pitchFamily="49" charset="0"/>
+              </a:rPr>
+              <a:t>    </a:t>
+            </a:r>
+            <a:r>
+              <a:rPr lang="en-US" dirty="0" err="1">
+                <a:solidFill>
+                  <a:srgbClr val="000000"/>
+                </a:solidFill>
+                <a:latin typeface="Consolas" panose="020B0609020204030204" pitchFamily="49" charset="0"/>
+              </a:rPr>
+              <a:t>setTimeout</a:t>
+            </a:r>
+            <a:r>
+              <a:rPr lang="en-US" dirty="0">
+                <a:solidFill>
+                  <a:srgbClr val="000000"/>
+                </a:solidFill>
+                <a:latin typeface="Consolas" panose="020B0609020204030204" pitchFamily="49" charset="0"/>
+              </a:rPr>
+              <a:t>(() </a:t>
+            </a:r>
+            <a:r>
+              <a:rPr lang="en-US" dirty="0">
+                <a:solidFill>
+                  <a:srgbClr val="0000FF"/>
+                </a:solidFill>
+                <a:latin typeface="Consolas" panose="020B0609020204030204" pitchFamily="49" charset="0"/>
+              </a:rPr>
+              <a:t>=&gt;</a:t>
+            </a:r>
+            <a:r>
+              <a:rPr lang="en-US" dirty="0">
+                <a:solidFill>
+                  <a:srgbClr val="000000"/>
+                </a:solidFill>
+                <a:latin typeface="Consolas" panose="020B0609020204030204" pitchFamily="49" charset="0"/>
+              </a:rPr>
+              <a:t> {</a:t>
+            </a:r>
+          </a:p>
+          <a:p>
+            <a:r>
+              <a:rPr lang="en-US" dirty="0">
+                <a:solidFill>
+                  <a:srgbClr val="000000"/>
+                </a:solidFill>
+                <a:latin typeface="Consolas" panose="020B0609020204030204" pitchFamily="49" charset="0"/>
+              </a:rPr>
+              <a:t>        console.log(</a:t>
+            </a:r>
+            <a:r>
+              <a:rPr lang="en-US" dirty="0">
+                <a:solidFill>
+                  <a:srgbClr val="A31515"/>
+                </a:solidFill>
+                <a:latin typeface="Consolas" panose="020B0609020204030204" pitchFamily="49" charset="0"/>
+              </a:rPr>
+              <a:t>"thread 2 running"</a:t>
+            </a:r>
+            <a:r>
+              <a:rPr lang="en-US" dirty="0">
+                <a:solidFill>
+                  <a:srgbClr val="000000"/>
+                </a:solidFill>
+                <a:latin typeface="Consolas" panose="020B0609020204030204" pitchFamily="49" charset="0"/>
+              </a:rPr>
+              <a:t>)</a:t>
+            </a:r>
+          </a:p>
+          <a:p>
+            <a:r>
+              <a:rPr lang="en-US" dirty="0">
+                <a:solidFill>
+                  <a:srgbClr val="000000"/>
+                </a:solidFill>
+                <a:latin typeface="Consolas" panose="020B0609020204030204" pitchFamily="49" charset="0"/>
+              </a:rPr>
+              <a:t>        console.log(</a:t>
+            </a:r>
+            <a:r>
+              <a:rPr lang="en-US" dirty="0">
+                <a:solidFill>
+                  <a:srgbClr val="A31515"/>
+                </a:solidFill>
+                <a:latin typeface="Consolas" panose="020B0609020204030204" pitchFamily="49" charset="0"/>
+              </a:rPr>
+              <a:t>"thread 2 finishing"</a:t>
+            </a:r>
+            <a:r>
+              <a:rPr lang="en-US" dirty="0">
+                <a:solidFill>
+                  <a:srgbClr val="000000"/>
+                </a:solidFill>
+                <a:latin typeface="Consolas" panose="020B0609020204030204" pitchFamily="49" charset="0"/>
+              </a:rPr>
+              <a:t>)</a:t>
+            </a:r>
+          </a:p>
+          <a:p>
+            <a:r>
+              <a:rPr lang="en-US" dirty="0">
+                <a:solidFill>
+                  <a:srgbClr val="000000"/>
+                </a:solidFill>
+                <a:latin typeface="Consolas" panose="020B0609020204030204" pitchFamily="49" charset="0"/>
+              </a:rPr>
+              <a:t>    })</a:t>
+            </a:r>
+          </a:p>
+          <a:p>
+            <a:r>
+              <a:rPr lang="en-US" dirty="0">
+                <a:solidFill>
+                  <a:srgbClr val="000000"/>
+                </a:solidFill>
+                <a:latin typeface="Consolas" panose="020B0609020204030204" pitchFamily="49" charset="0"/>
+              </a:rPr>
+              <a:t>    console.log(</a:t>
+            </a:r>
+            <a:r>
+              <a:rPr lang="en-US" dirty="0">
+                <a:solidFill>
+                  <a:srgbClr val="A31515"/>
+                </a:solidFill>
+                <a:latin typeface="Consolas" panose="020B0609020204030204" pitchFamily="49" charset="0"/>
+              </a:rPr>
+              <a:t>"promise exiting"</a:t>
+            </a:r>
+            <a:r>
+              <a:rPr lang="en-US" dirty="0">
+                <a:solidFill>
+                  <a:srgbClr val="000000"/>
+                </a:solidFill>
+                <a:latin typeface="Consolas" panose="020B0609020204030204" pitchFamily="49" charset="0"/>
+              </a:rPr>
+              <a:t>)</a:t>
+            </a:r>
+          </a:p>
+          <a:p>
+            <a:r>
+              <a:rPr lang="en-US" dirty="0">
+                <a:solidFill>
+                  <a:srgbClr val="000000"/>
+                </a:solidFill>
+                <a:latin typeface="Consolas" panose="020B0609020204030204" pitchFamily="49" charset="0"/>
+              </a:rPr>
+              <a:t>})</a:t>
+            </a:r>
+          </a:p>
+          <a:p>
+            <a:br>
+              <a:rPr lang="en-US" dirty="0">
+                <a:solidFill>
+                  <a:srgbClr val="000000"/>
+                </a:solidFill>
+                <a:latin typeface="Consolas" panose="020B0609020204030204" pitchFamily="49" charset="0"/>
+              </a:rPr>
+            </a:br>
+            <a:r>
+              <a:rPr lang="en-US" dirty="0">
+                <a:solidFill>
+                  <a:srgbClr val="000000"/>
+                </a:solidFill>
+                <a:latin typeface="Consolas" panose="020B0609020204030204" pitchFamily="49" charset="0"/>
+              </a:rPr>
+              <a:t>console.log(</a:t>
+            </a:r>
+            <a:r>
+              <a:rPr lang="en-US" dirty="0">
+                <a:solidFill>
+                  <a:srgbClr val="A31515"/>
+                </a:solidFill>
+                <a:latin typeface="Consolas" panose="020B0609020204030204" pitchFamily="49" charset="0"/>
+              </a:rPr>
+              <a:t>"main thread finishing"</a:t>
+            </a:r>
+            <a:r>
+              <a:rPr lang="en-US" dirty="0">
+                <a:solidFill>
+                  <a:srgbClr val="000000"/>
+                </a:solidFill>
+                <a:latin typeface="Consolas" panose="020B0609020204030204" pitchFamily="49" charset="0"/>
+              </a:rPr>
+              <a:t>)</a:t>
+            </a:r>
+            <a:endParaRPr lang="en-US" b="0" dirty="0">
+              <a:solidFill>
+                <a:srgbClr val="000000"/>
+              </a:solidFill>
+              <a:effectLst/>
+              <a:latin typeface="Consolas" panose="020B0609020204030204" pitchFamily="49" charset="0"/>
+            </a:endParaRPr>
+          </a:p>
+        </p:txBody>
+      </p:sp>
+      <p:sp>
+        <p:nvSpPr>
+          <p:cNvPr id="6" name="Rectangle 5">
+            <a:extLst>
+              <a:ext uri="{FF2B5EF4-FFF2-40B4-BE49-F238E27FC236}">
+                <a16:creationId xmlns:a16="http://schemas.microsoft.com/office/drawing/2014/main" id="{BC9905DA-A244-4DDA-A3E1-13CDC193D467}"/>
+              </a:ext>
+            </a:extLst>
+          </p:cNvPr>
+          <p:cNvSpPr/>
+          <p:nvPr/>
+        </p:nvSpPr>
+        <p:spPr>
+          <a:xfrm>
+            <a:off x="8243668" y="2410605"/>
+            <a:ext cx="3734972" cy="2031325"/>
+          </a:xfrm>
+          <a:prstGeom prst="rect">
+            <a:avLst/>
+          </a:prstGeom>
+          <a:ln w="19050">
+            <a:solidFill>
+              <a:schemeClr val="tx1"/>
+            </a:solidFill>
+          </a:ln>
+        </p:spPr>
+        <p:txBody>
+          <a:bodyPr wrap="square">
+            <a:spAutoFit/>
+          </a:bodyPr>
+          <a:lstStyle/>
+          <a:p>
+            <a:r>
+              <a:rPr lang="en-US" dirty="0">
+                <a:latin typeface="Consolas" panose="020B0609020204030204" pitchFamily="49" charset="0"/>
+              </a:rPr>
+              <a:t>main thread running</a:t>
+            </a:r>
+          </a:p>
+          <a:p>
+            <a:r>
+              <a:rPr lang="en-US" dirty="0">
+                <a:latin typeface="Consolas" panose="020B0609020204030204" pitchFamily="49" charset="0"/>
+              </a:rPr>
+              <a:t>this part is run immediately</a:t>
+            </a:r>
+          </a:p>
+          <a:p>
+            <a:r>
+              <a:rPr lang="en-US" dirty="0">
+                <a:latin typeface="Consolas" panose="020B0609020204030204" pitchFamily="49" charset="0"/>
+              </a:rPr>
+              <a:t>creating new thread...</a:t>
+            </a:r>
+          </a:p>
+          <a:p>
+            <a:r>
+              <a:rPr lang="en-US" dirty="0">
+                <a:latin typeface="Consolas" panose="020B0609020204030204" pitchFamily="49" charset="0"/>
+              </a:rPr>
+              <a:t>promise exiting</a:t>
+            </a:r>
+          </a:p>
+          <a:p>
+            <a:r>
+              <a:rPr lang="en-US" dirty="0">
+                <a:latin typeface="Consolas" panose="020B0609020204030204" pitchFamily="49" charset="0"/>
+              </a:rPr>
+              <a:t>main thread finishing</a:t>
+            </a:r>
+          </a:p>
+          <a:p>
+            <a:r>
+              <a:rPr lang="en-US" dirty="0">
+                <a:latin typeface="Consolas" panose="020B0609020204030204" pitchFamily="49" charset="0"/>
+              </a:rPr>
+              <a:t>thread 2 running</a:t>
+            </a:r>
+          </a:p>
+          <a:p>
+            <a:r>
+              <a:rPr lang="en-US" dirty="0">
+                <a:latin typeface="Consolas" panose="020B0609020204030204" pitchFamily="49" charset="0"/>
+              </a:rPr>
+              <a:t>thread 2 finishing</a:t>
+            </a:r>
+          </a:p>
+        </p:txBody>
+      </p:sp>
+      <p:sp>
+        <p:nvSpPr>
+          <p:cNvPr id="7" name="Arrow: Right 6">
+            <a:extLst>
+              <a:ext uri="{FF2B5EF4-FFF2-40B4-BE49-F238E27FC236}">
+                <a16:creationId xmlns:a16="http://schemas.microsoft.com/office/drawing/2014/main" id="{C4DEF8A3-51C8-4D4C-931A-209EE0F2B460}"/>
+              </a:ext>
+            </a:extLst>
+          </p:cNvPr>
+          <p:cNvSpPr/>
+          <p:nvPr/>
+        </p:nvSpPr>
+        <p:spPr>
+          <a:xfrm>
+            <a:off x="7177635" y="3084987"/>
+            <a:ext cx="879231" cy="583809"/>
+          </a:xfrm>
+          <a:prstGeom prst="rightArrow">
+            <a:avLst/>
+          </a:prstGeom>
+          <a:solidFill>
+            <a:schemeClr val="accent1">
+              <a:lumMod val="40000"/>
+              <a:lumOff val="60000"/>
+            </a:schemeClr>
+          </a:solidFill>
+          <a:ln>
+            <a:solidFill>
+              <a:srgbClr val="0070C0"/>
+            </a:solidFill>
+          </a:ln>
+        </p:spPr>
+        <p:style>
+          <a:lnRef idx="2">
+            <a:schemeClr val="accent1">
+              <a:shade val="50000"/>
+            </a:schemeClr>
+          </a:lnRef>
+          <a:fillRef idx="1">
+            <a:schemeClr val="accent1"/>
+          </a:fillRef>
+          <a:effectRef idx="0">
+            <a:schemeClr val="accent1"/>
+          </a:effectRef>
+          <a:fontRef idx="minor">
+            <a:schemeClr val="lt1"/>
+          </a:fontRef>
+        </p:style>
+        <p:txBody>
+          <a:bodyPr rtlCol="0" anchor="ctr"/>
+          <a:lstStyle/>
+          <a:p>
+            <a:pPr algn="l"/>
+            <a:endParaRPr lang="en-US" dirty="0">
+              <a:solidFill>
+                <a:schemeClr val="tx1"/>
+              </a:solidFill>
+            </a:endParaRPr>
+          </a:p>
+        </p:txBody>
+      </p:sp>
+    </p:spTree>
+    <p:extLst>
+      <p:ext uri="{BB962C8B-B14F-4D97-AF65-F5344CB8AC3E}">
+        <p14:creationId xmlns:p14="http://schemas.microsoft.com/office/powerpoint/2010/main" val="3808453626"/>
+      </p:ext>
+    </p:extLst>
+  </p:cSld>
+  <p:clrMapOvr>
+    <a:masterClrMapping/>
+  </p:clrMapOvr>
+</p:sld>
+</file>
+
+<file path=ppt/slides/slide11.xml><?xml version="1.0" encoding="utf-8"?>
+<p:sld xmlns:a="http://schemas.openxmlformats.org/drawingml/2006/main" xmlns:r="http://schemas.openxmlformats.org/officeDocument/2006/relationships" xmlns:p="http://schemas.openxmlformats.org/presentationml/2006/main">
+  <p:cSld>
+    <p:spTree>
+      <p:nvGrpSpPr>
+        <p:cNvPr id="1" name=""/>
+        <p:cNvGrpSpPr/>
+        <p:nvPr/>
+      </p:nvGrpSpPr>
+      <p:grpSpPr>
+        <a:xfrm>
+          <a:off x="0" y="0"/>
+          <a:ext cx="0" cy="0"/>
+          <a:chOff x="0" y="0"/>
+          <a:chExt cx="0" cy="0"/>
+        </a:xfrm>
+      </p:grpSpPr>
+      <p:sp>
+        <p:nvSpPr>
+          <p:cNvPr id="2" name="Title 1">
+            <a:extLst>
+              <a:ext uri="{FF2B5EF4-FFF2-40B4-BE49-F238E27FC236}">
                 <a16:creationId xmlns:a16="http://schemas.microsoft.com/office/drawing/2014/main" id="{79E03FDA-6383-4728-BD83-8EAB1C7D9049}"/>
               </a:ext>
             </a:extLst>
@@ -4834,7 +5490,7 @@
           <a:p>
             <a:fld id="{20F37917-FD3A-4669-9018-DA04BCDD3D75}" type="slidenum">
               <a:rPr lang="en-US" smtClean="0"/>
-              <a:t>10</a:t>
+              <a:t>11</a:t>
             </a:fld>
             <a:endParaRPr lang="en-US"/>
           </a:p>
@@ -4853,7 +5509,7 @@
 </p:sld>
 </file>
 
-<file path=ppt/slides/slide11.xml><?xml version="1.0" encoding="utf-8"?>
+<file path=ppt/slides/slide12.xml><?xml version="1.0" encoding="utf-8"?>
 <p:sld xmlns:a="http://schemas.openxmlformats.org/drawingml/2006/main" xmlns:r="http://schemas.openxmlformats.org/officeDocument/2006/relationships" xmlns:p="http://schemas.openxmlformats.org/presentationml/2006/main">
   <p:cSld>
     <p:spTree>
@@ -4921,7 +5577,7 @@
           <a:p>
             <a:fld id="{20F37917-FD3A-4669-9018-DA04BCDD3D75}" type="slidenum">
               <a:rPr lang="en-US" smtClean="0"/>
-              <a:t>11</a:t>
+              <a:t>12</a:t>
             </a:fld>
             <a:endParaRPr lang="en-US"/>
           </a:p>
@@ -5832,7 +6488,7 @@
 </p:sld>
 </file>
 
-<file path=ppt/slides/slide12.xml><?xml version="1.0" encoding="utf-8"?>
+<file path=ppt/slides/slide13.xml><?xml version="1.0" encoding="utf-8"?>
 <p:sld xmlns:a="http://schemas.openxmlformats.org/drawingml/2006/main" xmlns:r="http://schemas.openxmlformats.org/officeDocument/2006/relationships" xmlns:p="http://schemas.openxmlformats.org/presentationml/2006/main">
   <p:cSld>
     <p:spTree>
@@ -5900,7 +6556,7 @@
           <a:p>
             <a:fld id="{20F37917-FD3A-4669-9018-DA04BCDD3D75}" type="slidenum">
               <a:rPr lang="en-US" smtClean="0"/>
-              <a:t>12</a:t>
+              <a:t>13</a:t>
             </a:fld>
             <a:endParaRPr lang="en-US"/>
           </a:p>
@@ -7244,7 +7900,7 @@
 </p:sld>
 </file>
 
-<file path=ppt/slides/slide13.xml><?xml version="1.0" encoding="utf-8"?>
+<file path=ppt/slides/slide14.xml><?xml version="1.0" encoding="utf-8"?>
 <p:sld xmlns:a="http://schemas.openxmlformats.org/drawingml/2006/main" xmlns:r="http://schemas.openxmlformats.org/officeDocument/2006/relationships" xmlns:p="http://schemas.openxmlformats.org/presentationml/2006/main">
   <p:cSld>
     <p:spTree>
@@ -7312,7 +7968,7 @@
           <a:p>
             <a:fld id="{20F37917-FD3A-4669-9018-DA04BCDD3D75}" type="slidenum">
               <a:rPr lang="en-US" smtClean="0"/>
-              <a:t>13</a:t>
+              <a:t>14</a:t>
             </a:fld>
             <a:endParaRPr lang="en-US" dirty="0"/>
           </a:p>
@@ -8265,7 +8921,7 @@
 </p:sld>
 </file>
 
-<file path=ppt/slides/slide14.xml><?xml version="1.0" encoding="utf-8"?>
+<file path=ppt/slides/slide15.xml><?xml version="1.0" encoding="utf-8"?>
 <p:sld xmlns:a="http://schemas.openxmlformats.org/drawingml/2006/main" xmlns:r="http://schemas.openxmlformats.org/officeDocument/2006/relationships" xmlns:p="http://schemas.openxmlformats.org/presentationml/2006/main">
   <p:cSld>
     <p:spTree>
@@ -8333,7 +8989,7 @@
           <a:p>
             <a:fld id="{20F37917-FD3A-4669-9018-DA04BCDD3D75}" type="slidenum">
               <a:rPr lang="en-US" smtClean="0"/>
-              <a:t>14</a:t>
+              <a:t>15</a:t>
             </a:fld>
             <a:endParaRPr lang="en-US"/>
           </a:p>
@@ -9847,7 +10503,7 @@
 </p:sld>
 </file>
 
-<file path=ppt/slides/slide15.xml><?xml version="1.0" encoding="utf-8"?>
+<file path=ppt/slides/slide16.xml><?xml version="1.0" encoding="utf-8"?>
 <p:sld xmlns:a="http://schemas.openxmlformats.org/drawingml/2006/main" xmlns:r="http://schemas.openxmlformats.org/officeDocument/2006/relationships" xmlns:p="http://schemas.openxmlformats.org/presentationml/2006/main">
   <p:cSld>
     <p:spTree>
@@ -9915,7 +10571,7 @@
           <a:p>
             <a:fld id="{20F37917-FD3A-4669-9018-DA04BCDD3D75}" type="slidenum">
               <a:rPr lang="en-US" smtClean="0"/>
-              <a:t>15</a:t>
+              <a:t>16</a:t>
             </a:fld>
             <a:endParaRPr lang="en-US"/>
           </a:p>
@@ -11148,7 +11804,7 @@
 </p:sld>
 </file>
 
-<file path=ppt/slides/slide16.xml><?xml version="1.0" encoding="utf-8"?>
+<file path=ppt/slides/slide17.xml><?xml version="1.0" encoding="utf-8"?>
 <p:sld xmlns:a="http://schemas.openxmlformats.org/drawingml/2006/main" xmlns:r="http://schemas.openxmlformats.org/officeDocument/2006/relationships" xmlns:p="http://schemas.openxmlformats.org/presentationml/2006/main">
   <p:cSld>
     <p:spTree>
@@ -11216,7 +11872,7 @@
           <a:p>
             <a:fld id="{20F37917-FD3A-4669-9018-DA04BCDD3D75}" type="slidenum">
               <a:rPr lang="en-US" smtClean="0"/>
-              <a:t>16</a:t>
+              <a:t>17</a:t>
             </a:fld>
             <a:endParaRPr lang="en-US"/>
           </a:p>
@@ -12730,7 +13386,7 @@
 </p:sld>
 </file>
 
-<file path=ppt/slides/slide17.xml><?xml version="1.0" encoding="utf-8"?>
+<file path=ppt/slides/slide18.xml><?xml version="1.0" encoding="utf-8"?>
 <p:sld xmlns:a="http://schemas.openxmlformats.org/drawingml/2006/main" xmlns:r="http://schemas.openxmlformats.org/officeDocument/2006/relationships" xmlns:p="http://schemas.openxmlformats.org/presentationml/2006/main">
   <p:cSld>
     <p:spTree>
@@ -12798,7 +13454,7 @@
           <a:p>
             <a:fld id="{20F37917-FD3A-4669-9018-DA04BCDD3D75}" type="slidenum">
               <a:rPr lang="en-US" smtClean="0"/>
-              <a:t>17</a:t>
+              <a:t>18</a:t>
             </a:fld>
             <a:endParaRPr lang="en-US"/>
           </a:p>
@@ -13845,7 +14501,7 @@
 </p:sld>
 </file>
 
-<file path=ppt/slides/slide18.xml><?xml version="1.0" encoding="utf-8"?>
+<file path=ppt/slides/slide19.xml><?xml version="1.0" encoding="utf-8"?>
 <p:sld xmlns:a="http://schemas.openxmlformats.org/drawingml/2006/main" xmlns:r="http://schemas.openxmlformats.org/officeDocument/2006/relationships" xmlns:p="http://schemas.openxmlformats.org/presentationml/2006/main">
   <p:cSld>
     <p:spTree>
@@ -13913,7 +14569,7 @@
           <a:p>
             <a:fld id="{20F37917-FD3A-4669-9018-DA04BCDD3D75}" type="slidenum">
               <a:rPr lang="en-US" smtClean="0"/>
-              <a:t>18</a:t>
+              <a:t>19</a:t>
             </a:fld>
             <a:endParaRPr lang="en-US"/>
           </a:p>
@@ -15143,122 +15799,6 @@
 </p:sld>
 </file>
 
-<file path=ppt/slides/slide19.xml><?xml version="1.0" encoding="utf-8"?>
-<p:sld xmlns:a="http://schemas.openxmlformats.org/drawingml/2006/main" xmlns:r="http://schemas.openxmlformats.org/officeDocument/2006/relationships" xmlns:p="http://schemas.openxmlformats.org/presentationml/2006/main">
-  <p:cSld>
-    <p:spTree>
-      <p:nvGrpSpPr>
-        <p:cNvPr id="1" name=""/>
-        <p:cNvGrpSpPr/>
-        <p:nvPr/>
-      </p:nvGrpSpPr>
-      <p:grpSpPr>
-        <a:xfrm>
-          <a:off x="0" y="0"/>
-          <a:ext cx="0" cy="0"/>
-          <a:chOff x="0" y="0"/>
-          <a:chExt cx="0" cy="0"/>
-        </a:xfrm>
-      </p:grpSpPr>
-      <p:sp>
-        <p:nvSpPr>
-          <p:cNvPr id="2" name="Title 1">
-            <a:extLst>
-              <a:ext uri="{FF2B5EF4-FFF2-40B4-BE49-F238E27FC236}">
-                <a16:creationId xmlns:a16="http://schemas.microsoft.com/office/drawing/2014/main" id="{14C6B09D-3B20-4579-B26A-4E9D168D3FD7}"/>
-              </a:ext>
-            </a:extLst>
-          </p:cNvPr>
-          <p:cNvSpPr>
-            <a:spLocks noGrp="1"/>
-          </p:cNvSpPr>
-          <p:nvPr>
-            <p:ph type="title"/>
-          </p:nvPr>
-        </p:nvSpPr>
-        <p:spPr/>
-        <p:txBody>
-          <a:bodyPr/>
-          <a:lstStyle/>
-          <a:p>
-            <a:r>
-              <a:rPr lang="en-US" dirty="0">
-                <a:highlight>
-                  <a:srgbClr val="FFFF00"/>
-                </a:highlight>
-              </a:rPr>
-              <a:t>Review</a:t>
-            </a:r>
-          </a:p>
-        </p:txBody>
-      </p:sp>
-      <p:sp>
-        <p:nvSpPr>
-          <p:cNvPr id="3" name="Content Placeholder 2">
-            <a:extLst>
-              <a:ext uri="{FF2B5EF4-FFF2-40B4-BE49-F238E27FC236}">
-                <a16:creationId xmlns:a16="http://schemas.microsoft.com/office/drawing/2014/main" id="{E9C89AB4-21E6-4835-A04E-590A8B38CE40}"/>
-              </a:ext>
-            </a:extLst>
-          </p:cNvPr>
-          <p:cNvSpPr>
-            <a:spLocks noGrp="1"/>
-          </p:cNvSpPr>
-          <p:nvPr>
-            <p:ph idx="1"/>
-          </p:nvPr>
-        </p:nvSpPr>
-        <p:spPr/>
-        <p:txBody>
-          <a:bodyPr/>
-          <a:lstStyle/>
-          <a:p>
-            <a:endParaRPr lang="en-US" dirty="0"/>
-          </a:p>
-        </p:txBody>
-      </p:sp>
-      <p:sp>
-        <p:nvSpPr>
-          <p:cNvPr id="4" name="Slide Number Placeholder 3">
-            <a:extLst>
-              <a:ext uri="{FF2B5EF4-FFF2-40B4-BE49-F238E27FC236}">
-                <a16:creationId xmlns:a16="http://schemas.microsoft.com/office/drawing/2014/main" id="{6B2EE045-9031-4348-A894-97B178AF5FBF}"/>
-              </a:ext>
-            </a:extLst>
-          </p:cNvPr>
-          <p:cNvSpPr>
-            <a:spLocks noGrp="1"/>
-          </p:cNvSpPr>
-          <p:nvPr>
-            <p:ph type="sldNum" sz="quarter" idx="12"/>
-          </p:nvPr>
-        </p:nvSpPr>
-        <p:spPr/>
-        <p:txBody>
-          <a:bodyPr/>
-          <a:lstStyle/>
-          <a:p>
-            <a:fld id="{20F37917-FD3A-4669-9018-DA04BCDD3D75}" type="slidenum">
-              <a:rPr lang="en-US" smtClean="0"/>
-              <a:t>19</a:t>
-            </a:fld>
-            <a:endParaRPr lang="en-US"/>
-          </a:p>
-        </p:txBody>
-      </p:sp>
-    </p:spTree>
-    <p:extLst>
-      <p:ext uri="{BB962C8B-B14F-4D97-AF65-F5344CB8AC3E}">
-        <p14:creationId xmlns:p14="http://schemas.microsoft.com/office/powerpoint/2010/main" val="3537564276"/>
-      </p:ext>
-    </p:extLst>
-  </p:cSld>
-  <p:clrMapOvr>
-    <a:masterClrMapping/>
-  </p:clrMapOvr>
-</p:sld>
-</file>
-
 <file path=ppt/slides/slide2.xml><?xml version="1.0" encoding="utf-8"?>
 <p:sld xmlns:a="http://schemas.openxmlformats.org/drawingml/2006/main" xmlns:r="http://schemas.openxmlformats.org/officeDocument/2006/relationships" xmlns:p="http://schemas.openxmlformats.org/presentationml/2006/main">
   <p:cSld>
@@ -15341,14 +15881,14 @@
             <a:pPr lvl="1"/>
             <a:r>
               <a:rPr lang="en-US" dirty="0"/>
+              <a:t>Describe 3 ways in which threads may become ready for execution</a:t>
+            </a:r>
+          </a:p>
+          <a:p>
+            <a:pPr lvl="1"/>
+            <a:r>
+              <a:rPr lang="en-US" dirty="0"/>
               <a:t>Explain what a "promise" is</a:t>
-            </a:r>
-          </a:p>
-          <a:p>
-            <a:pPr lvl="1"/>
-            <a:r>
-              <a:rPr lang="en-US" dirty="0"/>
-              <a:t>Describe 3 ways in which threads may become ready for execution</a:t>
             </a:r>
           </a:p>
           <a:p>
@@ -15493,14 +16033,14 @@
             <a:pPr lvl="1"/>
             <a:r>
               <a:rPr lang="en-US" dirty="0"/>
+              <a:t>Describe 3 ways in which threads may become ready for execution</a:t>
+            </a:r>
+          </a:p>
+          <a:p>
+            <a:pPr lvl="1"/>
+            <a:r>
+              <a:rPr lang="en-US" dirty="0"/>
               <a:t>Explain what a "promise" is</a:t>
-            </a:r>
-          </a:p>
-          <a:p>
-            <a:pPr lvl="1"/>
-            <a:r>
-              <a:rPr lang="en-US" dirty="0"/>
-              <a:t>Describe 3 ways in which threads may become ready for execution</a:t>
             </a:r>
           </a:p>
           <a:p>
@@ -18862,6 +19402,344 @@
           <p:cNvPr id="2" name="Title 1">
             <a:extLst>
               <a:ext uri="{FF2B5EF4-FFF2-40B4-BE49-F238E27FC236}">
+                <a16:creationId xmlns:a16="http://schemas.microsoft.com/office/drawing/2014/main" id="{A4406949-0DD6-42A5-881B-31DBC8B66FD3}"/>
+              </a:ext>
+            </a:extLst>
+          </p:cNvPr>
+          <p:cNvSpPr>
+            <a:spLocks noGrp="1"/>
+          </p:cNvSpPr>
+          <p:nvPr>
+            <p:ph type="title"/>
+          </p:nvPr>
+        </p:nvSpPr>
+        <p:spPr/>
+        <p:txBody>
+          <a:bodyPr/>
+          <a:lstStyle/>
+          <a:p>
+            <a:r>
+              <a:rPr lang="en-US" dirty="0"/>
+              <a:t>How can a thread become ready?</a:t>
+            </a:r>
+          </a:p>
+        </p:txBody>
+      </p:sp>
+      <p:sp>
+        <p:nvSpPr>
+          <p:cNvPr id="3" name="Content Placeholder 2">
+            <a:extLst>
+              <a:ext uri="{FF2B5EF4-FFF2-40B4-BE49-F238E27FC236}">
+                <a16:creationId xmlns:a16="http://schemas.microsoft.com/office/drawing/2014/main" id="{8C700E7F-E263-4754-A218-E7B43812ED8E}"/>
+              </a:ext>
+            </a:extLst>
+          </p:cNvPr>
+          <p:cNvSpPr>
+            <a:spLocks noGrp="1"/>
+          </p:cNvSpPr>
+          <p:nvPr>
+            <p:ph idx="1"/>
+          </p:nvPr>
+        </p:nvSpPr>
+        <p:spPr/>
+        <p:txBody>
+          <a:bodyPr/>
+          <a:lstStyle/>
+          <a:p>
+            <a:r>
+              <a:rPr lang="en-US" dirty="0"/>
+              <a:t>There are roughly 3 ways in which a thread can become ready:</a:t>
+            </a:r>
+          </a:p>
+          <a:p>
+            <a:pPr lvl="1"/>
+            <a:r>
+              <a:rPr lang="en-US" dirty="0"/>
+              <a:t>it can become ready at a specific time. </a:t>
+            </a:r>
+          </a:p>
+          <a:p>
+            <a:pPr lvl="1"/>
+            <a:r>
+              <a:rPr lang="en-US" dirty="0"/>
+              <a:t>it can become ready when some input/output event occurs</a:t>
+            </a:r>
+          </a:p>
+          <a:p>
+            <a:pPr lvl="1"/>
+            <a:r>
+              <a:rPr lang="en-US" dirty="0"/>
+              <a:t>it can become ready when some other thread or threads complete.</a:t>
+            </a:r>
+          </a:p>
+        </p:txBody>
+      </p:sp>
+      <p:sp>
+        <p:nvSpPr>
+          <p:cNvPr id="4" name="Slide Number Placeholder 3">
+            <a:extLst>
+              <a:ext uri="{FF2B5EF4-FFF2-40B4-BE49-F238E27FC236}">
+                <a16:creationId xmlns:a16="http://schemas.microsoft.com/office/drawing/2014/main" id="{B2C6BE9E-EC27-4CE5-9550-8B49A6C1E162}"/>
+              </a:ext>
+            </a:extLst>
+          </p:cNvPr>
+          <p:cNvSpPr>
+            <a:spLocks noGrp="1"/>
+          </p:cNvSpPr>
+          <p:nvPr>
+            <p:ph type="sldNum" sz="quarter" idx="12"/>
+          </p:nvPr>
+        </p:nvSpPr>
+        <p:spPr/>
+        <p:txBody>
+          <a:bodyPr/>
+          <a:lstStyle/>
+          <a:p>
+            <a:fld id="{20F37917-FD3A-4669-9018-DA04BCDD3D75}" type="slidenum">
+              <a:rPr lang="en-US" smtClean="0"/>
+              <a:t>8</a:t>
+            </a:fld>
+            <a:endParaRPr lang="en-US"/>
+          </a:p>
+        </p:txBody>
+      </p:sp>
+      <p:sp>
+        <p:nvSpPr>
+          <p:cNvPr id="5" name="Arrow: Left 4">
+            <a:extLst>
+              <a:ext uri="{FF2B5EF4-FFF2-40B4-BE49-F238E27FC236}">
+                <a16:creationId xmlns:a16="http://schemas.microsoft.com/office/drawing/2014/main" id="{6F87559D-E2CF-452E-A808-6DF1846B836F}"/>
+              </a:ext>
+            </a:extLst>
+          </p:cNvPr>
+          <p:cNvSpPr/>
+          <p:nvPr/>
+        </p:nvSpPr>
+        <p:spPr>
+          <a:xfrm>
+            <a:off x="8294986" y="1723435"/>
+            <a:ext cx="3374428" cy="1325563"/>
+          </a:xfrm>
+          <a:prstGeom prst="leftArrow">
+            <a:avLst>
+              <a:gd name="adj1" fmla="val 60548"/>
+              <a:gd name="adj2" fmla="val 50000"/>
+            </a:avLst>
+          </a:prstGeom>
+          <a:noFill/>
+          <a:ln>
+            <a:solidFill>
+              <a:srgbClr val="0070C0"/>
+            </a:solidFill>
+          </a:ln>
+        </p:spPr>
+        <p:style>
+          <a:lnRef idx="2">
+            <a:schemeClr val="accent1">
+              <a:shade val="50000"/>
+            </a:schemeClr>
+          </a:lnRef>
+          <a:fillRef idx="1">
+            <a:schemeClr val="accent1"/>
+          </a:fillRef>
+          <a:effectRef idx="0">
+            <a:schemeClr val="accent1"/>
+          </a:effectRef>
+          <a:fontRef idx="minor">
+            <a:schemeClr val="lt1"/>
+          </a:fontRef>
+        </p:style>
+        <p:txBody>
+          <a:bodyPr rtlCol="0" anchor="ctr"/>
+          <a:lstStyle/>
+          <a:p>
+            <a:pPr algn="l"/>
+            <a:r>
+              <a:rPr lang="en-US" dirty="0">
+                <a:solidFill>
+                  <a:schemeClr val="tx1"/>
+                </a:solidFill>
+              </a:rPr>
+              <a:t>e.g. it was created by </a:t>
+            </a:r>
+            <a:r>
+              <a:rPr lang="en-US" dirty="0" err="1">
+                <a:solidFill>
+                  <a:schemeClr val="tx1"/>
+                </a:solidFill>
+              </a:rPr>
+              <a:t>setTimeout</a:t>
+            </a:r>
+            <a:r>
+              <a:rPr lang="en-US" dirty="0">
+                <a:solidFill>
+                  <a:schemeClr val="tx1"/>
+                </a:solidFill>
+              </a:rPr>
+              <a:t> (see next slide)</a:t>
+            </a:r>
+          </a:p>
+        </p:txBody>
+      </p:sp>
+      <p:sp>
+        <p:nvSpPr>
+          <p:cNvPr id="6" name="Arrow: Left 5">
+            <a:extLst>
+              <a:ext uri="{FF2B5EF4-FFF2-40B4-BE49-F238E27FC236}">
+                <a16:creationId xmlns:a16="http://schemas.microsoft.com/office/drawing/2014/main" id="{6615737F-0A92-45CA-9F9A-FBBAA6AA2EE2}"/>
+              </a:ext>
+            </a:extLst>
+          </p:cNvPr>
+          <p:cNvSpPr/>
+          <p:nvPr/>
+        </p:nvSpPr>
+        <p:spPr>
+          <a:xfrm>
+            <a:off x="8510266" y="2528972"/>
+            <a:ext cx="3374428" cy="1130498"/>
+          </a:xfrm>
+          <a:prstGeom prst="leftArrow">
+            <a:avLst>
+              <a:gd name="adj1" fmla="val 47813"/>
+              <a:gd name="adj2" fmla="val 50000"/>
+            </a:avLst>
+          </a:prstGeom>
+          <a:noFill/>
+          <a:ln>
+            <a:solidFill>
+              <a:srgbClr val="0070C0"/>
+            </a:solidFill>
+          </a:ln>
+        </p:spPr>
+        <p:style>
+          <a:lnRef idx="2">
+            <a:schemeClr val="accent1">
+              <a:shade val="50000"/>
+            </a:schemeClr>
+          </a:lnRef>
+          <a:fillRef idx="1">
+            <a:schemeClr val="accent1"/>
+          </a:fillRef>
+          <a:effectRef idx="0">
+            <a:schemeClr val="accent1"/>
+          </a:effectRef>
+          <a:fontRef idx="minor">
+            <a:schemeClr val="lt1"/>
+          </a:fontRef>
+        </p:style>
+        <p:txBody>
+          <a:bodyPr rtlCol="0" anchor="ctr"/>
+          <a:lstStyle/>
+          <a:p>
+            <a:pPr algn="l"/>
+            <a:r>
+              <a:rPr lang="en-US" dirty="0">
+                <a:solidFill>
+                  <a:schemeClr val="tx1"/>
+                </a:solidFill>
+              </a:rPr>
+              <a:t>the most common case</a:t>
+            </a:r>
+          </a:p>
+        </p:txBody>
+      </p:sp>
+      <p:sp>
+        <p:nvSpPr>
+          <p:cNvPr id="7" name="Arrow: Left 6">
+            <a:extLst>
+              <a:ext uri="{FF2B5EF4-FFF2-40B4-BE49-F238E27FC236}">
+                <a16:creationId xmlns:a16="http://schemas.microsoft.com/office/drawing/2014/main" id="{76FAEF33-979A-4811-8143-779F562F8C7B}"/>
+              </a:ext>
+            </a:extLst>
+          </p:cNvPr>
+          <p:cNvSpPr/>
+          <p:nvPr/>
+        </p:nvSpPr>
+        <p:spPr>
+          <a:xfrm>
+            <a:off x="8725546" y="3139444"/>
+            <a:ext cx="3374428" cy="1130498"/>
+          </a:xfrm>
+          <a:prstGeom prst="leftArrow">
+            <a:avLst>
+              <a:gd name="adj1" fmla="val 47813"/>
+              <a:gd name="adj2" fmla="val 50000"/>
+            </a:avLst>
+          </a:prstGeom>
+          <a:noFill/>
+          <a:ln>
+            <a:solidFill>
+              <a:srgbClr val="0070C0"/>
+            </a:solidFill>
+          </a:ln>
+        </p:spPr>
+        <p:style>
+          <a:lnRef idx="2">
+            <a:schemeClr val="accent1">
+              <a:shade val="50000"/>
+            </a:schemeClr>
+          </a:lnRef>
+          <a:fillRef idx="1">
+            <a:schemeClr val="accent1"/>
+          </a:fillRef>
+          <a:effectRef idx="0">
+            <a:schemeClr val="accent1"/>
+          </a:effectRef>
+          <a:fontRef idx="minor">
+            <a:schemeClr val="lt1"/>
+          </a:fontRef>
+        </p:style>
+        <p:txBody>
+          <a:bodyPr rtlCol="0" anchor="ctr"/>
+          <a:lstStyle/>
+          <a:p>
+            <a:pPr algn="l"/>
+            <a:r>
+              <a:rPr lang="en-US" dirty="0">
+                <a:solidFill>
+                  <a:schemeClr val="tx1"/>
+                </a:solidFill>
+              </a:rPr>
+              <a:t>our focus in this lesson</a:t>
+            </a:r>
+          </a:p>
+        </p:txBody>
+      </p:sp>
+    </p:spTree>
+    <p:extLst>
+      <p:ext uri="{BB962C8B-B14F-4D97-AF65-F5344CB8AC3E}">
+        <p14:creationId xmlns:p14="http://schemas.microsoft.com/office/powerpoint/2010/main" val="966597571"/>
+      </p:ext>
+    </p:extLst>
+  </p:cSld>
+  <p:clrMapOvr>
+    <a:masterClrMapping/>
+  </p:clrMapOvr>
+</p:sld>
+</file>
+
+<file path=ppt/slides/slide9.xml><?xml version="1.0" encoding="utf-8"?>
+<p:sld xmlns:a="http://schemas.openxmlformats.org/drawingml/2006/main" xmlns:r="http://schemas.openxmlformats.org/officeDocument/2006/relationships" xmlns:p="http://schemas.openxmlformats.org/presentationml/2006/main">
+  <p:cSld>
+    <p:spTree>
+      <p:nvGrpSpPr>
+        <p:cNvPr id="1" name=""/>
+        <p:cNvGrpSpPr/>
+        <p:nvPr/>
+      </p:nvGrpSpPr>
+      <p:grpSpPr>
+        <a:xfrm>
+          <a:off x="0" y="0"/>
+          <a:ext cx="0" cy="0"/>
+          <a:chOff x="0" y="0"/>
+          <a:chExt cx="0" cy="0"/>
+        </a:xfrm>
+      </p:grpSpPr>
+      <p:sp>
+        <p:nvSpPr>
+          <p:cNvPr id="2" name="Title 1">
+            <a:extLst>
+              <a:ext uri="{FF2B5EF4-FFF2-40B4-BE49-F238E27FC236}">
                 <a16:creationId xmlns:a16="http://schemas.microsoft.com/office/drawing/2014/main" id="{3F0EFE28-C9CA-4AAE-AC36-5BB83D9BD6A3}"/>
               </a:ext>
             </a:extLst>
@@ -18959,7 +19837,7 @@
           <a:p>
             <a:fld id="{20F37917-FD3A-4669-9018-DA04BCDD3D75}" type="slidenum">
               <a:rPr lang="en-US" smtClean="0"/>
-              <a:t>8</a:t>
+              <a:t>9</a:t>
             </a:fld>
             <a:endParaRPr lang="en-US"/>
           </a:p>
@@ -19474,662 +20352,6 @@
       <p:bldP spid="8" grpId="0" animBg="1"/>
     </p:bldLst>
   </p:timing>
-</p:sld>
-</file>
-
-<file path=ppt/slides/slide9.xml><?xml version="1.0" encoding="utf-8"?>
-<p:sld xmlns:a="http://schemas.openxmlformats.org/drawingml/2006/main" xmlns:r="http://schemas.openxmlformats.org/officeDocument/2006/relationships" xmlns:p="http://schemas.openxmlformats.org/presentationml/2006/main">
-  <p:cSld>
-    <p:spTree>
-      <p:nvGrpSpPr>
-        <p:cNvPr id="1" name=""/>
-        <p:cNvGrpSpPr/>
-        <p:nvPr/>
-      </p:nvGrpSpPr>
-      <p:grpSpPr>
-        <a:xfrm>
-          <a:off x="0" y="0"/>
-          <a:ext cx="0" cy="0"/>
-          <a:chOff x="0" y="0"/>
-          <a:chExt cx="0" cy="0"/>
-        </a:xfrm>
-      </p:grpSpPr>
-      <p:sp>
-        <p:nvSpPr>
-          <p:cNvPr id="2" name="Title 1">
-            <a:extLst>
-              <a:ext uri="{FF2B5EF4-FFF2-40B4-BE49-F238E27FC236}">
-                <a16:creationId xmlns:a16="http://schemas.microsoft.com/office/drawing/2014/main" id="{9856CDAB-EDB2-430B-891E-15491BE49E14}"/>
-              </a:ext>
-            </a:extLst>
-          </p:cNvPr>
-          <p:cNvSpPr>
-            <a:spLocks noGrp="1"/>
-          </p:cNvSpPr>
-          <p:nvPr>
-            <p:ph type="title"/>
-          </p:nvPr>
-        </p:nvSpPr>
-        <p:spPr/>
-        <p:txBody>
-          <a:bodyPr/>
-          <a:lstStyle/>
-          <a:p>
-            <a:r>
-              <a:rPr lang="en-US" dirty="0"/>
-              <a:t>Naming the thread you just created</a:t>
-            </a:r>
-          </a:p>
-        </p:txBody>
-      </p:sp>
-      <p:sp>
-        <p:nvSpPr>
-          <p:cNvPr id="3" name="Content Placeholder 2">
-            <a:extLst>
-              <a:ext uri="{FF2B5EF4-FFF2-40B4-BE49-F238E27FC236}">
-                <a16:creationId xmlns:a16="http://schemas.microsoft.com/office/drawing/2014/main" id="{1E1F461F-81C7-4B85-BCFB-650200814A20}"/>
-              </a:ext>
-            </a:extLst>
-          </p:cNvPr>
-          <p:cNvSpPr>
-            <a:spLocks noGrp="1"/>
-          </p:cNvSpPr>
-          <p:nvPr>
-            <p:ph idx="1"/>
-          </p:nvPr>
-        </p:nvSpPr>
-        <p:spPr/>
-        <p:txBody>
-          <a:bodyPr/>
-          <a:lstStyle/>
-          <a:p>
-            <a:r>
-              <a:rPr lang="en-US" dirty="0"/>
-              <a:t>When you create a thread, you can get a handle for it.  This handle is called a </a:t>
-            </a:r>
-            <a:r>
-              <a:rPr lang="en-US" dirty="0">
-                <a:solidFill>
-                  <a:srgbClr val="FF0000"/>
-                </a:solidFill>
-              </a:rPr>
-              <a:t>promise</a:t>
-            </a:r>
-            <a:r>
-              <a:rPr lang="en-US" dirty="0"/>
-              <a:t>.</a:t>
-            </a:r>
-          </a:p>
-        </p:txBody>
-      </p:sp>
-      <p:sp>
-        <p:nvSpPr>
-          <p:cNvPr id="4" name="Slide Number Placeholder 3">
-            <a:extLst>
-              <a:ext uri="{FF2B5EF4-FFF2-40B4-BE49-F238E27FC236}">
-                <a16:creationId xmlns:a16="http://schemas.microsoft.com/office/drawing/2014/main" id="{37201718-DDAB-4795-A020-96ACB86F6648}"/>
-              </a:ext>
-            </a:extLst>
-          </p:cNvPr>
-          <p:cNvSpPr>
-            <a:spLocks noGrp="1"/>
-          </p:cNvSpPr>
-          <p:nvPr>
-            <p:ph type="sldNum" sz="quarter" idx="12"/>
-          </p:nvPr>
-        </p:nvSpPr>
-        <p:spPr/>
-        <p:txBody>
-          <a:bodyPr/>
-          <a:lstStyle/>
-          <a:p>
-            <a:fld id="{20F37917-FD3A-4669-9018-DA04BCDD3D75}" type="slidenum">
-              <a:rPr lang="en-US" smtClean="0"/>
-              <a:t>9</a:t>
-            </a:fld>
-            <a:endParaRPr lang="en-US"/>
-          </a:p>
-        </p:txBody>
-      </p:sp>
-      <p:sp>
-        <p:nvSpPr>
-          <p:cNvPr id="5" name="Rectangle 4">
-            <a:extLst>
-              <a:ext uri="{FF2B5EF4-FFF2-40B4-BE49-F238E27FC236}">
-                <a16:creationId xmlns:a16="http://schemas.microsoft.com/office/drawing/2014/main" id="{CC2BDC1D-7D7A-4BA3-BB02-E2B1E3B9E537}"/>
-              </a:ext>
-            </a:extLst>
-          </p:cNvPr>
-          <p:cNvSpPr/>
-          <p:nvPr/>
-        </p:nvSpPr>
-        <p:spPr>
-          <a:xfrm>
-            <a:off x="1081635" y="2410605"/>
-            <a:ext cx="6096000" cy="3693319"/>
-          </a:xfrm>
-          <a:prstGeom prst="rect">
-            <a:avLst/>
-          </a:prstGeom>
-        </p:spPr>
-        <p:txBody>
-          <a:bodyPr>
-            <a:spAutoFit/>
-          </a:bodyPr>
-          <a:lstStyle/>
-          <a:p>
-            <a:r>
-              <a:rPr lang="en-US" dirty="0">
-                <a:solidFill>
-                  <a:srgbClr val="000000"/>
-                </a:solidFill>
-                <a:latin typeface="Consolas" panose="020B0609020204030204" pitchFamily="49" charset="0"/>
-              </a:rPr>
-              <a:t>console.log(</a:t>
-            </a:r>
-            <a:r>
-              <a:rPr lang="en-US" dirty="0">
-                <a:solidFill>
-                  <a:srgbClr val="A31515"/>
-                </a:solidFill>
-                <a:latin typeface="Consolas" panose="020B0609020204030204" pitchFamily="49" charset="0"/>
-              </a:rPr>
-              <a:t>"main thread running"</a:t>
-            </a:r>
-            <a:r>
-              <a:rPr lang="en-US" dirty="0">
-                <a:solidFill>
-                  <a:srgbClr val="000000"/>
-                </a:solidFill>
-                <a:latin typeface="Consolas" panose="020B0609020204030204" pitchFamily="49" charset="0"/>
-              </a:rPr>
-              <a:t>)</a:t>
-            </a:r>
-          </a:p>
-          <a:p>
-            <a:br>
-              <a:rPr lang="en-US" dirty="0">
-                <a:solidFill>
-                  <a:srgbClr val="000000"/>
-                </a:solidFill>
-                <a:latin typeface="Consolas" panose="020B0609020204030204" pitchFamily="49" charset="0"/>
-              </a:rPr>
-            </a:br>
-            <a:r>
-              <a:rPr lang="en-US" dirty="0">
-                <a:solidFill>
-                  <a:srgbClr val="0000FF"/>
-                </a:solidFill>
-                <a:latin typeface="Consolas" panose="020B0609020204030204" pitchFamily="49" charset="0"/>
-              </a:rPr>
-              <a:t>const</a:t>
-            </a:r>
-            <a:r>
-              <a:rPr lang="en-US" dirty="0">
-                <a:solidFill>
-                  <a:srgbClr val="000000"/>
-                </a:solidFill>
-                <a:latin typeface="Consolas" panose="020B0609020204030204" pitchFamily="49" charset="0"/>
-              </a:rPr>
-              <a:t> p2 = </a:t>
-            </a:r>
-            <a:r>
-              <a:rPr lang="en-US" dirty="0">
-                <a:solidFill>
-                  <a:srgbClr val="0000FF"/>
-                </a:solidFill>
-                <a:latin typeface="Consolas" panose="020B0609020204030204" pitchFamily="49" charset="0"/>
-              </a:rPr>
-              <a:t>new</a:t>
-            </a:r>
-            <a:r>
-              <a:rPr lang="en-US" dirty="0">
-                <a:solidFill>
-                  <a:srgbClr val="000000"/>
-                </a:solidFill>
-                <a:latin typeface="Consolas" panose="020B0609020204030204" pitchFamily="49" charset="0"/>
-              </a:rPr>
-              <a:t> Promise((resolve) </a:t>
-            </a:r>
-            <a:r>
-              <a:rPr lang="en-US" dirty="0">
-                <a:solidFill>
-                  <a:srgbClr val="0000FF"/>
-                </a:solidFill>
-                <a:latin typeface="Consolas" panose="020B0609020204030204" pitchFamily="49" charset="0"/>
-              </a:rPr>
-              <a:t>=&gt;</a:t>
-            </a:r>
-            <a:r>
-              <a:rPr lang="en-US" dirty="0">
-                <a:solidFill>
-                  <a:srgbClr val="000000"/>
-                </a:solidFill>
-                <a:latin typeface="Consolas" panose="020B0609020204030204" pitchFamily="49" charset="0"/>
-              </a:rPr>
-              <a:t> {</a:t>
-            </a:r>
-          </a:p>
-          <a:p>
-            <a:r>
-              <a:rPr lang="en-US" dirty="0">
-                <a:solidFill>
-                  <a:srgbClr val="000000"/>
-                </a:solidFill>
-                <a:latin typeface="Consolas" panose="020B0609020204030204" pitchFamily="49" charset="0"/>
-              </a:rPr>
-              <a:t>    console.log(</a:t>
-            </a:r>
-            <a:r>
-              <a:rPr lang="en-US" dirty="0">
-                <a:solidFill>
-                  <a:srgbClr val="A31515"/>
-                </a:solidFill>
-                <a:latin typeface="Consolas" panose="020B0609020204030204" pitchFamily="49" charset="0"/>
-              </a:rPr>
-              <a:t>"this part is run immediately"</a:t>
-            </a:r>
-            <a:r>
-              <a:rPr lang="en-US" dirty="0">
-                <a:solidFill>
-                  <a:srgbClr val="000000"/>
-                </a:solidFill>
-                <a:latin typeface="Consolas" panose="020B0609020204030204" pitchFamily="49" charset="0"/>
-              </a:rPr>
-              <a:t>)</a:t>
-            </a:r>
-          </a:p>
-          <a:p>
-            <a:r>
-              <a:rPr lang="en-US" dirty="0">
-                <a:solidFill>
-                  <a:srgbClr val="000000"/>
-                </a:solidFill>
-                <a:latin typeface="Consolas" panose="020B0609020204030204" pitchFamily="49" charset="0"/>
-              </a:rPr>
-              <a:t>    console.log(</a:t>
-            </a:r>
-            <a:r>
-              <a:rPr lang="en-US" dirty="0">
-                <a:solidFill>
-                  <a:srgbClr val="A31515"/>
-                </a:solidFill>
-                <a:latin typeface="Consolas" panose="020B0609020204030204" pitchFamily="49" charset="0"/>
-              </a:rPr>
-              <a:t>"creating new thread..."</a:t>
-            </a:r>
-            <a:r>
-              <a:rPr lang="en-US" dirty="0">
-                <a:solidFill>
-                  <a:srgbClr val="000000"/>
-                </a:solidFill>
-                <a:latin typeface="Consolas" panose="020B0609020204030204" pitchFamily="49" charset="0"/>
-              </a:rPr>
-              <a:t>)</a:t>
-            </a:r>
-          </a:p>
-          <a:p>
-            <a:r>
-              <a:rPr lang="en-US" dirty="0">
-                <a:solidFill>
-                  <a:srgbClr val="000000"/>
-                </a:solidFill>
-                <a:latin typeface="Consolas" panose="020B0609020204030204" pitchFamily="49" charset="0"/>
-              </a:rPr>
-              <a:t>    </a:t>
-            </a:r>
-            <a:r>
-              <a:rPr lang="en-US" dirty="0" err="1">
-                <a:solidFill>
-                  <a:srgbClr val="000000"/>
-                </a:solidFill>
-                <a:latin typeface="Consolas" panose="020B0609020204030204" pitchFamily="49" charset="0"/>
-              </a:rPr>
-              <a:t>setTimeout</a:t>
-            </a:r>
-            <a:r>
-              <a:rPr lang="en-US" dirty="0">
-                <a:solidFill>
-                  <a:srgbClr val="000000"/>
-                </a:solidFill>
-                <a:latin typeface="Consolas" panose="020B0609020204030204" pitchFamily="49" charset="0"/>
-              </a:rPr>
-              <a:t>(() </a:t>
-            </a:r>
-            <a:r>
-              <a:rPr lang="en-US" dirty="0">
-                <a:solidFill>
-                  <a:srgbClr val="0000FF"/>
-                </a:solidFill>
-                <a:latin typeface="Consolas" panose="020B0609020204030204" pitchFamily="49" charset="0"/>
-              </a:rPr>
-              <a:t>=&gt;</a:t>
-            </a:r>
-            <a:r>
-              <a:rPr lang="en-US" dirty="0">
-                <a:solidFill>
-                  <a:srgbClr val="000000"/>
-                </a:solidFill>
-                <a:latin typeface="Consolas" panose="020B0609020204030204" pitchFamily="49" charset="0"/>
-              </a:rPr>
-              <a:t> {</a:t>
-            </a:r>
-          </a:p>
-          <a:p>
-            <a:r>
-              <a:rPr lang="en-US" dirty="0">
-                <a:solidFill>
-                  <a:srgbClr val="000000"/>
-                </a:solidFill>
-                <a:latin typeface="Consolas" panose="020B0609020204030204" pitchFamily="49" charset="0"/>
-              </a:rPr>
-              <a:t>        console.log(</a:t>
-            </a:r>
-            <a:r>
-              <a:rPr lang="en-US" dirty="0">
-                <a:solidFill>
-                  <a:srgbClr val="A31515"/>
-                </a:solidFill>
-                <a:latin typeface="Consolas" panose="020B0609020204030204" pitchFamily="49" charset="0"/>
-              </a:rPr>
-              <a:t>"thread 2 running"</a:t>
-            </a:r>
-            <a:r>
-              <a:rPr lang="en-US" dirty="0">
-                <a:solidFill>
-                  <a:srgbClr val="000000"/>
-                </a:solidFill>
-                <a:latin typeface="Consolas" panose="020B0609020204030204" pitchFamily="49" charset="0"/>
-              </a:rPr>
-              <a:t>)</a:t>
-            </a:r>
-          </a:p>
-          <a:p>
-            <a:r>
-              <a:rPr lang="en-US" dirty="0">
-                <a:solidFill>
-                  <a:srgbClr val="000000"/>
-                </a:solidFill>
-                <a:latin typeface="Consolas" panose="020B0609020204030204" pitchFamily="49" charset="0"/>
-              </a:rPr>
-              <a:t>        console.log(</a:t>
-            </a:r>
-            <a:r>
-              <a:rPr lang="en-US" dirty="0">
-                <a:solidFill>
-                  <a:srgbClr val="A31515"/>
-                </a:solidFill>
-                <a:latin typeface="Consolas" panose="020B0609020204030204" pitchFamily="49" charset="0"/>
-              </a:rPr>
-              <a:t>"thread 2 finishing"</a:t>
-            </a:r>
-            <a:r>
-              <a:rPr lang="en-US" dirty="0">
-                <a:solidFill>
-                  <a:srgbClr val="000000"/>
-                </a:solidFill>
-                <a:latin typeface="Consolas" panose="020B0609020204030204" pitchFamily="49" charset="0"/>
-              </a:rPr>
-              <a:t>)</a:t>
-            </a:r>
-          </a:p>
-          <a:p>
-            <a:r>
-              <a:rPr lang="en-US" dirty="0">
-                <a:solidFill>
-                  <a:srgbClr val="000000"/>
-                </a:solidFill>
-                <a:latin typeface="Consolas" panose="020B0609020204030204" pitchFamily="49" charset="0"/>
-              </a:rPr>
-              <a:t>    })</a:t>
-            </a:r>
-          </a:p>
-          <a:p>
-            <a:r>
-              <a:rPr lang="en-US" dirty="0">
-                <a:solidFill>
-                  <a:srgbClr val="000000"/>
-                </a:solidFill>
-                <a:latin typeface="Consolas" panose="020B0609020204030204" pitchFamily="49" charset="0"/>
-              </a:rPr>
-              <a:t>    console.log(</a:t>
-            </a:r>
-            <a:r>
-              <a:rPr lang="en-US" dirty="0">
-                <a:solidFill>
-                  <a:srgbClr val="A31515"/>
-                </a:solidFill>
-                <a:latin typeface="Consolas" panose="020B0609020204030204" pitchFamily="49" charset="0"/>
-              </a:rPr>
-              <a:t>"promise exiting"</a:t>
-            </a:r>
-            <a:r>
-              <a:rPr lang="en-US" dirty="0">
-                <a:solidFill>
-                  <a:srgbClr val="000000"/>
-                </a:solidFill>
-                <a:latin typeface="Consolas" panose="020B0609020204030204" pitchFamily="49" charset="0"/>
-              </a:rPr>
-              <a:t>)</a:t>
-            </a:r>
-          </a:p>
-          <a:p>
-            <a:r>
-              <a:rPr lang="en-US" dirty="0">
-                <a:solidFill>
-                  <a:srgbClr val="000000"/>
-                </a:solidFill>
-                <a:latin typeface="Consolas" panose="020B0609020204030204" pitchFamily="49" charset="0"/>
-              </a:rPr>
-              <a:t>})</a:t>
-            </a:r>
-          </a:p>
-          <a:p>
-            <a:br>
-              <a:rPr lang="en-US" dirty="0">
-                <a:solidFill>
-                  <a:srgbClr val="000000"/>
-                </a:solidFill>
-                <a:latin typeface="Consolas" panose="020B0609020204030204" pitchFamily="49" charset="0"/>
-              </a:rPr>
-            </a:br>
-            <a:r>
-              <a:rPr lang="en-US" dirty="0">
-                <a:solidFill>
-                  <a:srgbClr val="000000"/>
-                </a:solidFill>
-                <a:latin typeface="Consolas" panose="020B0609020204030204" pitchFamily="49" charset="0"/>
-              </a:rPr>
-              <a:t>console.log(</a:t>
-            </a:r>
-            <a:r>
-              <a:rPr lang="en-US" dirty="0">
-                <a:solidFill>
-                  <a:srgbClr val="A31515"/>
-                </a:solidFill>
-                <a:latin typeface="Consolas" panose="020B0609020204030204" pitchFamily="49" charset="0"/>
-              </a:rPr>
-              <a:t>"main thread finishing"</a:t>
-            </a:r>
-            <a:r>
-              <a:rPr lang="en-US" dirty="0">
-                <a:solidFill>
-                  <a:srgbClr val="000000"/>
-                </a:solidFill>
-                <a:latin typeface="Consolas" panose="020B0609020204030204" pitchFamily="49" charset="0"/>
-              </a:rPr>
-              <a:t>)</a:t>
-            </a:r>
-            <a:endParaRPr lang="en-US" b="0" dirty="0">
-              <a:solidFill>
-                <a:srgbClr val="000000"/>
-              </a:solidFill>
-              <a:effectLst/>
-              <a:latin typeface="Consolas" panose="020B0609020204030204" pitchFamily="49" charset="0"/>
-            </a:endParaRPr>
-          </a:p>
-        </p:txBody>
-      </p:sp>
-      <p:sp>
-        <p:nvSpPr>
-          <p:cNvPr id="6" name="Rectangle 5">
-            <a:extLst>
-              <a:ext uri="{FF2B5EF4-FFF2-40B4-BE49-F238E27FC236}">
-                <a16:creationId xmlns:a16="http://schemas.microsoft.com/office/drawing/2014/main" id="{BC9905DA-A244-4DDA-A3E1-13CDC193D467}"/>
-              </a:ext>
-            </a:extLst>
-          </p:cNvPr>
-          <p:cNvSpPr/>
-          <p:nvPr/>
-        </p:nvSpPr>
-        <p:spPr>
-          <a:xfrm>
-            <a:off x="8243668" y="2410605"/>
-            <a:ext cx="3734972" cy="2031325"/>
-          </a:xfrm>
-          <a:prstGeom prst="rect">
-            <a:avLst/>
-          </a:prstGeom>
-          <a:ln w="19050">
-            <a:solidFill>
-              <a:schemeClr val="tx1"/>
-            </a:solidFill>
-          </a:ln>
-        </p:spPr>
-        <p:txBody>
-          <a:bodyPr wrap="square">
-            <a:spAutoFit/>
-          </a:bodyPr>
-          <a:lstStyle/>
-          <a:p>
-            <a:r>
-              <a:rPr lang="en-US" dirty="0">
-                <a:latin typeface="Consolas" panose="020B0609020204030204" pitchFamily="49" charset="0"/>
-              </a:rPr>
-              <a:t>main thread running</a:t>
-            </a:r>
-          </a:p>
-          <a:p>
-            <a:r>
-              <a:rPr lang="en-US" dirty="0">
-                <a:latin typeface="Consolas" panose="020B0609020204030204" pitchFamily="49" charset="0"/>
-              </a:rPr>
-              <a:t>this part is run immediately</a:t>
-            </a:r>
-          </a:p>
-          <a:p>
-            <a:r>
-              <a:rPr lang="en-US" dirty="0">
-                <a:latin typeface="Consolas" panose="020B0609020204030204" pitchFamily="49" charset="0"/>
-              </a:rPr>
-              <a:t>creating new thread...</a:t>
-            </a:r>
-          </a:p>
-          <a:p>
-            <a:r>
-              <a:rPr lang="en-US" dirty="0">
-                <a:latin typeface="Consolas" panose="020B0609020204030204" pitchFamily="49" charset="0"/>
-              </a:rPr>
-              <a:t>promise exiting</a:t>
-            </a:r>
-          </a:p>
-          <a:p>
-            <a:r>
-              <a:rPr lang="en-US" dirty="0">
-                <a:latin typeface="Consolas" panose="020B0609020204030204" pitchFamily="49" charset="0"/>
-              </a:rPr>
-              <a:t>main thread finishing</a:t>
-            </a:r>
-          </a:p>
-          <a:p>
-            <a:r>
-              <a:rPr lang="en-US" dirty="0">
-                <a:latin typeface="Consolas" panose="020B0609020204030204" pitchFamily="49" charset="0"/>
-              </a:rPr>
-              <a:t>thread 2 running</a:t>
-            </a:r>
-          </a:p>
-          <a:p>
-            <a:r>
-              <a:rPr lang="en-US" dirty="0">
-                <a:latin typeface="Consolas" panose="020B0609020204030204" pitchFamily="49" charset="0"/>
-              </a:rPr>
-              <a:t>thread 2 finishing</a:t>
-            </a:r>
-          </a:p>
-        </p:txBody>
-      </p:sp>
-      <p:sp>
-        <p:nvSpPr>
-          <p:cNvPr id="7" name="Arrow: Right 6">
-            <a:extLst>
-              <a:ext uri="{FF2B5EF4-FFF2-40B4-BE49-F238E27FC236}">
-                <a16:creationId xmlns:a16="http://schemas.microsoft.com/office/drawing/2014/main" id="{C4DEF8A3-51C8-4D4C-931A-209EE0F2B460}"/>
-              </a:ext>
-            </a:extLst>
-          </p:cNvPr>
-          <p:cNvSpPr/>
-          <p:nvPr/>
-        </p:nvSpPr>
-        <p:spPr>
-          <a:xfrm>
-            <a:off x="7177635" y="3084987"/>
-            <a:ext cx="879231" cy="583809"/>
-          </a:xfrm>
-          <a:prstGeom prst="rightArrow">
-            <a:avLst/>
-          </a:prstGeom>
-          <a:solidFill>
-            <a:schemeClr val="accent1">
-              <a:lumMod val="40000"/>
-              <a:lumOff val="60000"/>
-            </a:schemeClr>
-          </a:solidFill>
-          <a:ln>
-            <a:solidFill>
-              <a:srgbClr val="0070C0"/>
-            </a:solidFill>
-          </a:ln>
-        </p:spPr>
-        <p:style>
-          <a:lnRef idx="2">
-            <a:schemeClr val="accent1">
-              <a:shade val="50000"/>
-            </a:schemeClr>
-          </a:lnRef>
-          <a:fillRef idx="1">
-            <a:schemeClr val="accent1"/>
-          </a:fillRef>
-          <a:effectRef idx="0">
-            <a:schemeClr val="accent1"/>
-          </a:effectRef>
-          <a:fontRef idx="minor">
-            <a:schemeClr val="lt1"/>
-          </a:fontRef>
-        </p:style>
-        <p:txBody>
-          <a:bodyPr rtlCol="0" anchor="ctr"/>
-          <a:lstStyle/>
-          <a:p>
-            <a:pPr algn="l"/>
-            <a:endParaRPr lang="en-US" dirty="0">
-              <a:solidFill>
-                <a:schemeClr val="tx1"/>
-              </a:solidFill>
-            </a:endParaRPr>
-          </a:p>
-        </p:txBody>
-      </p:sp>
-    </p:spTree>
-    <p:extLst>
-      <p:ext uri="{BB962C8B-B14F-4D97-AF65-F5344CB8AC3E}">
-        <p14:creationId xmlns:p14="http://schemas.microsoft.com/office/powerpoint/2010/main" val="3808453626"/>
-      </p:ext>
-    </p:extLst>
-  </p:cSld>
-  <p:clrMapOvr>
-    <a:masterClrMapping/>
-  </p:clrMapOvr>
 </p:sld>
 </file>
 

</xml_diff>

<commit_message>
L4.1 and L4.2 mostly done
</commit_message>
<xml_diff>
--- a/Slides/Lesson 4.1 The JavaScript Thread Model.pptx
+++ b/Slides/Lesson 4.1 The JavaScript Thread Model.pptx
@@ -245,7 +245,7 @@
           <a:p>
             <a:fld id="{7C7E5181-6CF5-45F7-A87A-E0E0B1FD7549}" type="datetimeFigureOut">
               <a:rPr lang="en-US" smtClean="0"/>
-              <a:t>2/5/2021</a:t>
+              <a:t>2/6/2021</a:t>
             </a:fld>
             <a:endParaRPr lang="en-US"/>
           </a:p>
@@ -666,7 +666,7 @@
           <a:p>
             <a:fld id="{5D2A64DE-480B-420F-9649-4F8E696E08E0}" type="datetime1">
               <a:rPr lang="en-US" smtClean="0"/>
-              <a:t>2/5/2021</a:t>
+              <a:t>2/6/2021</a:t>
             </a:fld>
             <a:endParaRPr lang="en-US"/>
           </a:p>
@@ -900,7 +900,7 @@
           <a:p>
             <a:fld id="{0D3616D0-8311-4107-9726-6B805E7D05BA}" type="datetime1">
               <a:rPr lang="en-US" smtClean="0"/>
-              <a:t>2/5/2021</a:t>
+              <a:t>2/6/2021</a:t>
             </a:fld>
             <a:endParaRPr lang="en-US"/>
           </a:p>
@@ -1108,7 +1108,7 @@
           <a:p>
             <a:fld id="{3BC2557A-5C88-417A-A763-5AC779462A5F}" type="datetime1">
               <a:rPr lang="en-US" smtClean="0"/>
-              <a:t>2/5/2021</a:t>
+              <a:t>2/6/2021</a:t>
             </a:fld>
             <a:endParaRPr lang="en-US"/>
           </a:p>
@@ -1860,7 +1860,7 @@
           <a:p>
             <a:fld id="{07C7BFD4-467E-4EDE-93EA-052F5B39A4E5}" type="datetime1">
               <a:rPr lang="en-US" smtClean="0"/>
-              <a:t>2/5/2021</a:t>
+              <a:t>2/6/2021</a:t>
             </a:fld>
             <a:endParaRPr lang="en-US"/>
           </a:p>
@@ -2173,7 +2173,7 @@
           <a:p>
             <a:fld id="{A533CBE2-D5BE-47AC-ADC2-9CDFC1D0CF90}" type="datetime1">
               <a:rPr lang="en-US" smtClean="0"/>
-              <a:t>2/5/2021</a:t>
+              <a:t>2/6/2021</a:t>
             </a:fld>
             <a:endParaRPr lang="en-US"/>
           </a:p>
@@ -2474,7 +2474,7 @@
           <a:p>
             <a:fld id="{39B7EDB1-CE74-4951-85A2-0B01C2128E28}" type="datetime1">
               <a:rPr lang="en-US" smtClean="0"/>
-              <a:t>2/5/2021</a:t>
+              <a:t>2/6/2021</a:t>
             </a:fld>
             <a:endParaRPr lang="en-US"/>
           </a:p>
@@ -2922,7 +2922,7 @@
           <a:p>
             <a:fld id="{2BC7EB92-A5C2-4807-A9DC-9EDE6CBFB241}" type="datetime1">
               <a:rPr lang="en-US" smtClean="0"/>
-              <a:t>2/5/2021</a:t>
+              <a:t>2/6/2021</a:t>
             </a:fld>
             <a:endParaRPr lang="en-US"/>
           </a:p>
@@ -3068,7 +3068,7 @@
           <a:p>
             <a:fld id="{109E55A0-C911-4F03-82FC-7E5926047D46}" type="datetime1">
               <a:rPr lang="en-US" smtClean="0"/>
-              <a:t>2/5/2021</a:t>
+              <a:t>2/6/2021</a:t>
             </a:fld>
             <a:endParaRPr lang="en-US"/>
           </a:p>
@@ -3217,7 +3217,7 @@
           <a:p>
             <a:fld id="{2B7B7EE0-7771-4CD5-9B2B-3550753A54A1}" type="datetime1">
               <a:rPr lang="en-US" smtClean="0"/>
-              <a:t>2/5/2021</a:t>
+              <a:t>2/6/2021</a:t>
             </a:fld>
             <a:endParaRPr lang="en-US"/>
           </a:p>
@@ -3528,7 +3528,7 @@
           <a:p>
             <a:fld id="{F8B318B3-0E87-4416-A9B8-D891968C2727}" type="datetime1">
               <a:rPr lang="en-US" smtClean="0"/>
-              <a:t>2/5/2021</a:t>
+              <a:t>2/6/2021</a:t>
             </a:fld>
             <a:endParaRPr lang="en-US"/>
           </a:p>
@@ -3816,7 +3816,7 @@
           <a:p>
             <a:fld id="{EA476A42-A091-4468-A075-64A31BE59948}" type="datetime1">
               <a:rPr lang="en-US" smtClean="0"/>
-              <a:t>2/5/2021</a:t>
+              <a:t>2/6/2021</a:t>
             </a:fld>
             <a:endParaRPr lang="en-US"/>
           </a:p>
@@ -4057,7 +4057,7 @@
           <a:p>
             <a:fld id="{54D997E8-DDEE-43F1-8D9B-F8A1E11DE488}" type="datetime1">
               <a:rPr lang="en-US" smtClean="0"/>
-              <a:t>2/5/2021</a:t>
+              <a:t>2/6/2021</a:t>
             </a:fld>
             <a:endParaRPr lang="en-US"/>
           </a:p>
@@ -5465,6 +5465,12 @@
               <a:t>Not only that, but you can pass a value from p1 to p2.</a:t>
             </a:r>
           </a:p>
+          <a:p>
+            <a:r>
+              <a:rPr lang="en-US" dirty="0"/>
+              <a:t>IMPORTANT:  threads don't "return" when they are finished; they just pass a value to their successors– watch:</a:t>
+            </a:r>
+          </a:p>
         </p:txBody>
       </p:sp>
       <p:sp>
@@ -13966,7 +13972,7 @@
                 </a:solidFill>
                 <a:latin typeface="Consolas" panose="020B0609020204030204" pitchFamily="49" charset="0"/>
               </a:rPr>
-              <a:t>"p5 starting with"</a:t>
+              <a:t>"p5 received"</a:t>
             </a:r>
             <a:r>
               <a:rPr lang="en-US" dirty="0">

</xml_diff>